<commit_message>
Premiere presentation avec des modifications
</commit_message>
<xml_diff>
--- a/1er Présentation.pptx
+++ b/1er Présentation.pptx
@@ -7840,6 +7840,12 @@
             </a:r>
           </a:p>
           <a:p>
+            <a:r>
+              <a:rPr lang="fr-FR" dirty="0"/>
+              <a:t>Mise à jours </a:t>
+            </a:r>
+          </a:p>
+          <a:p>
             <a:pPr marL="0" indent="0">
               <a:buNone/>
             </a:pPr>
@@ -7865,7 +7871,7 @@
           <a:p>
             <a:r>
               <a:rPr lang="fr-FR" dirty="0"/>
-              <a:t>Mise à jours</a:t>
+              <a:t>Modification </a:t>
             </a:r>
           </a:p>
           <a:p>
@@ -8020,7 +8026,13 @@
       </p:sp>
       <p:pic>
         <p:nvPicPr>
-          <p:cNvPr id="4" name="Espace réservé du contenu 3" descr="Pharmacie"/>
+          <p:cNvPr id="7" name="Espace réservé du contenu 6">
+            <a:extLst>
+              <a:ext uri="{FF2B5EF4-FFF2-40B4-BE49-F238E27FC236}">
+                <a16:creationId xmlns:a16="http://schemas.microsoft.com/office/drawing/2014/main" id="{971445E8-DE84-45E3-B987-8610448E370E}"/>
+              </a:ext>
+            </a:extLst>
+          </p:cNvPr>
           <p:cNvPicPr>
             <a:picLocks noGrp="1" noChangeAspect="1"/>
           </p:cNvPicPr>
@@ -8036,12 +8048,9 @@
         </p:blipFill>
         <p:spPr>
           <a:xfrm>
-            <a:off x="1012825" y="848360"/>
-            <a:ext cx="10799445" cy="5982335"/>
+            <a:off x="2524897" y="848360"/>
+            <a:ext cx="6849922" cy="5761524"/>
           </a:xfrm>
-          <a:prstGeom prst="rect">
-            <a:avLst/>
-          </a:prstGeom>
         </p:spPr>
       </p:pic>
     </p:spTree>

</xml_diff>